<commit_message>
Modified document and ppt
</commit_message>
<xml_diff>
--- a/Data Encoders.pptx
+++ b/Data Encoders.pptx
@@ -8238,9 +8238,10 @@
           <a:lstStyle/>
           <a:p>
             <a:r>
-              <a:rPr lang="en-US" dirty="0"/>
-              <a:t>Need to renamed</a:t>
-            </a:r>
+              <a:rPr lang="en-US" dirty="0" smtClean="0"/>
+              <a:t>Score Estimation</a:t>
+            </a:r>
+            <a:endParaRPr lang="en-US" dirty="0"/>
           </a:p>
         </p:txBody>
       </p:sp>

</xml_diff>